<commit_message>
Integrate manageing files process to Bloom.Server.Filer.Utility namespace.
</commit_message>
<xml_diff>
--- a/tofuture/プレゼンテーション1.pptx
+++ b/tofuture/プレゼンテーション1.pptx
@@ -270,7 +270,7 @@
           <a:p>
             <a:fld id="{86335AB5-AE0B-4291-9555-DDF94DCDBED2}" type="datetimeFigureOut">
               <a:rPr kumimoji="1" lang="ja-JP" altLang="en-US" smtClean="0"/>
-              <a:t>2022/12/29</a:t>
+              <a:t>2023/1/5</a:t>
             </a:fld>
             <a:endParaRPr kumimoji="1" lang="ja-JP" altLang="en-US"/>
           </a:p>
@@ -500,7 +500,7 @@
           <a:p>
             <a:fld id="{86335AB5-AE0B-4291-9555-DDF94DCDBED2}" type="datetimeFigureOut">
               <a:rPr kumimoji="1" lang="ja-JP" altLang="en-US" smtClean="0"/>
-              <a:t>2022/12/29</a:t>
+              <a:t>2023/1/5</a:t>
             </a:fld>
             <a:endParaRPr kumimoji="1" lang="ja-JP" altLang="en-US"/>
           </a:p>
@@ -740,7 +740,7 @@
           <a:p>
             <a:fld id="{86335AB5-AE0B-4291-9555-DDF94DCDBED2}" type="datetimeFigureOut">
               <a:rPr kumimoji="1" lang="ja-JP" altLang="en-US" smtClean="0"/>
-              <a:t>2022/12/29</a:t>
+              <a:t>2023/1/5</a:t>
             </a:fld>
             <a:endParaRPr kumimoji="1" lang="ja-JP" altLang="en-US"/>
           </a:p>
@@ -970,7 +970,7 @@
           <a:p>
             <a:fld id="{86335AB5-AE0B-4291-9555-DDF94DCDBED2}" type="datetimeFigureOut">
               <a:rPr kumimoji="1" lang="ja-JP" altLang="en-US" smtClean="0"/>
-              <a:t>2022/12/29</a:t>
+              <a:t>2023/1/5</a:t>
             </a:fld>
             <a:endParaRPr kumimoji="1" lang="ja-JP" altLang="en-US"/>
           </a:p>
@@ -1245,7 +1245,7 @@
           <a:p>
             <a:fld id="{86335AB5-AE0B-4291-9555-DDF94DCDBED2}" type="datetimeFigureOut">
               <a:rPr kumimoji="1" lang="ja-JP" altLang="en-US" smtClean="0"/>
-              <a:t>2022/12/29</a:t>
+              <a:t>2023/1/5</a:t>
             </a:fld>
             <a:endParaRPr kumimoji="1" lang="ja-JP" altLang="en-US"/>
           </a:p>
@@ -1574,7 +1574,7 @@
           <a:p>
             <a:fld id="{86335AB5-AE0B-4291-9555-DDF94DCDBED2}" type="datetimeFigureOut">
               <a:rPr kumimoji="1" lang="ja-JP" altLang="en-US" smtClean="0"/>
-              <a:t>2022/12/29</a:t>
+              <a:t>2023/1/5</a:t>
             </a:fld>
             <a:endParaRPr kumimoji="1" lang="ja-JP" altLang="en-US"/>
           </a:p>
@@ -2050,7 +2050,7 @@
           <a:p>
             <a:fld id="{86335AB5-AE0B-4291-9555-DDF94DCDBED2}" type="datetimeFigureOut">
               <a:rPr kumimoji="1" lang="ja-JP" altLang="en-US" smtClean="0"/>
-              <a:t>2022/12/29</a:t>
+              <a:t>2023/1/5</a:t>
             </a:fld>
             <a:endParaRPr kumimoji="1" lang="ja-JP" altLang="en-US"/>
           </a:p>
@@ -2191,7 +2191,7 @@
           <a:p>
             <a:fld id="{86335AB5-AE0B-4291-9555-DDF94DCDBED2}" type="datetimeFigureOut">
               <a:rPr kumimoji="1" lang="ja-JP" altLang="en-US" smtClean="0"/>
-              <a:t>2022/12/29</a:t>
+              <a:t>2023/1/5</a:t>
             </a:fld>
             <a:endParaRPr kumimoji="1" lang="ja-JP" altLang="en-US"/>
           </a:p>
@@ -2304,7 +2304,7 @@
           <a:p>
             <a:fld id="{86335AB5-AE0B-4291-9555-DDF94DCDBED2}" type="datetimeFigureOut">
               <a:rPr kumimoji="1" lang="ja-JP" altLang="en-US" smtClean="0"/>
-              <a:t>2022/12/29</a:t>
+              <a:t>2023/1/5</a:t>
             </a:fld>
             <a:endParaRPr kumimoji="1" lang="ja-JP" altLang="en-US"/>
           </a:p>
@@ -2647,7 +2647,7 @@
           <a:p>
             <a:fld id="{86335AB5-AE0B-4291-9555-DDF94DCDBED2}" type="datetimeFigureOut">
               <a:rPr kumimoji="1" lang="ja-JP" altLang="en-US" smtClean="0"/>
-              <a:t>2022/12/29</a:t>
+              <a:t>2023/1/5</a:t>
             </a:fld>
             <a:endParaRPr kumimoji="1" lang="ja-JP" altLang="en-US"/>
           </a:p>
@@ -2935,7 +2935,7 @@
           <a:p>
             <a:fld id="{86335AB5-AE0B-4291-9555-DDF94DCDBED2}" type="datetimeFigureOut">
               <a:rPr kumimoji="1" lang="ja-JP" altLang="en-US" smtClean="0"/>
-              <a:t>2022/12/29</a:t>
+              <a:t>2023/1/5</a:t>
             </a:fld>
             <a:endParaRPr kumimoji="1" lang="ja-JP" altLang="en-US"/>
           </a:p>
@@ -3208,7 +3208,7 @@
           <a:p>
             <a:fld id="{86335AB5-AE0B-4291-9555-DDF94DCDBED2}" type="datetimeFigureOut">
               <a:rPr kumimoji="1" lang="ja-JP" altLang="en-US" smtClean="0"/>
-              <a:t>2022/12/29</a:t>
+              <a:t>2023/1/5</a:t>
             </a:fld>
             <a:endParaRPr kumimoji="1" lang="ja-JP" altLang="en-US"/>
           </a:p>
@@ -3644,17 +3644,13 @@
         <p:spPr>
           <a:xfrm>
             <a:off x="838200" y="365126"/>
-            <a:ext cx="10515600" cy="720696"/>
+            <a:ext cx="10515600" cy="945690"/>
           </a:xfrm>
         </p:spPr>
         <p:txBody>
           <a:bodyPr/>
           <a:lstStyle/>
           <a:p>
-            <a:r>
-              <a:rPr kumimoji="1" lang="en-US" altLang="ja-JP" dirty="0"/>
-              <a:t>File type list</a:t>
-            </a:r>
             <a:endParaRPr kumimoji="1" lang="ja-JP" altLang="en-US" dirty="0"/>
           </a:p>
         </p:txBody>
@@ -3673,7 +3669,7 @@
         </p:nvSpPr>
         <p:spPr>
           <a:xfrm>
-            <a:off x="838199" y="1204430"/>
+            <a:off x="838199" y="1837474"/>
             <a:ext cx="609462" cy="369332"/>
           </a:xfrm>
           <a:prstGeom prst="rect">
@@ -3709,212 +3705,8 @@
         </p:nvSpPr>
         <p:spPr>
           <a:xfrm>
-            <a:off x="4232795" y="1206811"/>
+            <a:off x="4232795" y="1839855"/>
             <a:ext cx="1023037" cy="369332"/>
-          </a:xfrm>
-          <a:prstGeom prst="rect">
-            <a:avLst/>
-          </a:prstGeom>
-          <a:noFill/>
-        </p:spPr>
-        <p:txBody>
-          <a:bodyPr wrap="none" rtlCol="0">
-            <a:spAutoFit/>
-          </a:bodyPr>
-          <a:lstStyle/>
-          <a:p>
-            <a:r>
-              <a:rPr kumimoji="1" lang="en-US" altLang="ja-JP" sz="1800" kern="1200" dirty="0">
-                <a:solidFill>
-                  <a:schemeClr val="accent2"/>
-                </a:solidFill>
-                <a:effectLst/>
-                <a:latin typeface="游ゴシック" panose="020B0400000000000000" pitchFamily="50" charset="-128"/>
-                <a:ea typeface="游ゴシック" panose="020B0400000000000000" pitchFamily="50" charset="-128"/>
-                <a:cs typeface="+mn-cs"/>
-              </a:rPr>
-              <a:t>/groups</a:t>
-            </a:r>
-            <a:endParaRPr kumimoji="1" lang="ja-JP" altLang="en-US" dirty="0">
-              <a:solidFill>
-                <a:schemeClr val="accent2"/>
-              </a:solidFill>
-            </a:endParaRPr>
-          </a:p>
-        </p:txBody>
-      </p:sp>
-      <p:sp>
-        <p:nvSpPr>
-          <p:cNvPr id="9" name="テキスト ボックス 8">
-            <a:extLst>
-              <a:ext uri="{FF2B5EF4-FFF2-40B4-BE49-F238E27FC236}">
-                <a16:creationId xmlns:a16="http://schemas.microsoft.com/office/drawing/2014/main" id="{0788878B-2597-E022-0CDD-9A4BD78DDC80}"/>
-              </a:ext>
-            </a:extLst>
-          </p:cNvPr>
-          <p:cNvSpPr txBox="1"/>
-          <p:nvPr/>
-        </p:nvSpPr>
-        <p:spPr>
-          <a:xfrm>
-            <a:off x="4232794" y="1674971"/>
-            <a:ext cx="898003" cy="369332"/>
-          </a:xfrm>
-          <a:prstGeom prst="rect">
-            <a:avLst/>
-          </a:prstGeom>
-          <a:noFill/>
-        </p:spPr>
-        <p:txBody>
-          <a:bodyPr wrap="none" rtlCol="0">
-            <a:spAutoFit/>
-          </a:bodyPr>
-          <a:lstStyle/>
-          <a:p>
-            <a:r>
-              <a:rPr kumimoji="1" lang="en-US" altLang="ja-JP" sz="1800" kern="1200" dirty="0">
-                <a:solidFill>
-                  <a:schemeClr val="accent2"/>
-                </a:solidFill>
-                <a:effectLst/>
-                <a:latin typeface="游ゴシック" panose="020B0400000000000000" pitchFamily="50" charset="-128"/>
-                <a:ea typeface="游ゴシック" panose="020B0400000000000000" pitchFamily="50" charset="-128"/>
-                <a:cs typeface="+mn-cs"/>
-              </a:rPr>
-              <a:t>/floors</a:t>
-            </a:r>
-            <a:endParaRPr kumimoji="1" lang="ja-JP" altLang="en-US" dirty="0">
-              <a:solidFill>
-                <a:schemeClr val="accent2"/>
-              </a:solidFill>
-            </a:endParaRPr>
-          </a:p>
-        </p:txBody>
-      </p:sp>
-      <p:sp>
-        <p:nvSpPr>
-          <p:cNvPr id="10" name="テキスト ボックス 9">
-            <a:extLst>
-              <a:ext uri="{FF2B5EF4-FFF2-40B4-BE49-F238E27FC236}">
-                <a16:creationId xmlns:a16="http://schemas.microsoft.com/office/drawing/2014/main" id="{8ED9F0FE-864F-8975-4873-F72BA74F71E0}"/>
-              </a:ext>
-            </a:extLst>
-          </p:cNvPr>
-          <p:cNvSpPr txBox="1"/>
-          <p:nvPr/>
-        </p:nvSpPr>
-        <p:spPr>
-          <a:xfrm>
-            <a:off x="4232794" y="2143131"/>
-            <a:ext cx="1013419" cy="369332"/>
-          </a:xfrm>
-          <a:prstGeom prst="rect">
-            <a:avLst/>
-          </a:prstGeom>
-          <a:noFill/>
-        </p:spPr>
-        <p:txBody>
-          <a:bodyPr wrap="none" rtlCol="0">
-            <a:spAutoFit/>
-          </a:bodyPr>
-          <a:lstStyle/>
-          <a:p>
-            <a:r>
-              <a:rPr kumimoji="1" lang="en-US" altLang="ja-JP" sz="1800" kern="1200" dirty="0">
-                <a:solidFill>
-                  <a:schemeClr val="accent2"/>
-                </a:solidFill>
-                <a:effectLst/>
-                <a:latin typeface="游ゴシック" panose="020B0400000000000000" pitchFamily="50" charset="-128"/>
-                <a:ea typeface="游ゴシック" panose="020B0400000000000000" pitchFamily="50" charset="-128"/>
-                <a:cs typeface="+mn-cs"/>
-              </a:rPr>
-              <a:t>/</a:t>
-            </a:r>
-            <a:r>
-              <a:rPr kumimoji="1" lang="en-US" altLang="ja-JP" sz="1800" kern="1200" dirty="0" err="1">
-                <a:solidFill>
-                  <a:schemeClr val="accent2"/>
-                </a:solidFill>
-                <a:effectLst/>
-                <a:latin typeface="游ゴシック" panose="020B0400000000000000" pitchFamily="50" charset="-128"/>
-                <a:ea typeface="游ゴシック" panose="020B0400000000000000" pitchFamily="50" charset="-128"/>
-                <a:cs typeface="+mn-cs"/>
-              </a:rPr>
-              <a:t>greads</a:t>
-            </a:r>
-            <a:endParaRPr kumimoji="1" lang="ja-JP" altLang="en-US" dirty="0">
-              <a:solidFill>
-                <a:schemeClr val="accent2"/>
-              </a:solidFill>
-            </a:endParaRPr>
-          </a:p>
-        </p:txBody>
-      </p:sp>
-      <p:sp>
-        <p:nvSpPr>
-          <p:cNvPr id="12" name="テキスト ボックス 11">
-            <a:extLst>
-              <a:ext uri="{FF2B5EF4-FFF2-40B4-BE49-F238E27FC236}">
-                <a16:creationId xmlns:a16="http://schemas.microsoft.com/office/drawing/2014/main" id="{091C4576-CA3A-78E9-20E5-02E0C65EFBEF}"/>
-              </a:ext>
-            </a:extLst>
-          </p:cNvPr>
-          <p:cNvSpPr txBox="1"/>
-          <p:nvPr/>
-        </p:nvSpPr>
-        <p:spPr>
-          <a:xfrm>
-            <a:off x="4232794" y="2611291"/>
-            <a:ext cx="1063112" cy="369332"/>
-          </a:xfrm>
-          <a:prstGeom prst="rect">
-            <a:avLst/>
-          </a:prstGeom>
-          <a:noFill/>
-        </p:spPr>
-        <p:txBody>
-          <a:bodyPr wrap="none" rtlCol="0">
-            <a:spAutoFit/>
-          </a:bodyPr>
-          <a:lstStyle/>
-          <a:p>
-            <a:r>
-              <a:rPr kumimoji="1" lang="en-US" altLang="ja-JP" sz="1800" kern="1200" dirty="0">
-                <a:solidFill>
-                  <a:schemeClr val="accent2"/>
-                </a:solidFill>
-                <a:effectLst/>
-                <a:latin typeface="游ゴシック" panose="020B0400000000000000" pitchFamily="50" charset="-128"/>
-                <a:ea typeface="游ゴシック" panose="020B0400000000000000" pitchFamily="50" charset="-128"/>
-                <a:cs typeface="+mn-cs"/>
-              </a:rPr>
-              <a:t>/medias</a:t>
-            </a:r>
-            <a:endParaRPr kumimoji="1" lang="ja-JP" altLang="en-US" dirty="0">
-              <a:solidFill>
-                <a:schemeClr val="accent2"/>
-              </a:solidFill>
-            </a:endParaRPr>
-          </a:p>
-        </p:txBody>
-      </p:sp>
-      <p:sp>
-        <p:nvSpPr>
-          <p:cNvPr id="13" name="テキスト ボックス 12">
-            <a:extLst>
-              <a:ext uri="{FF2B5EF4-FFF2-40B4-BE49-F238E27FC236}">
-                <a16:creationId xmlns:a16="http://schemas.microsoft.com/office/drawing/2014/main" id="{5CCEA30C-EA54-5D70-0CDF-B323A68E010A}"/>
-              </a:ext>
-            </a:extLst>
-          </p:cNvPr>
-          <p:cNvSpPr txBox="1"/>
-          <p:nvPr/>
-        </p:nvSpPr>
-        <p:spPr>
-          <a:xfrm>
-            <a:off x="3224439" y="4011351"/>
-            <a:ext cx="731290" cy="369332"/>
           </a:xfrm>
           <a:prstGeom prst="rect">
             <a:avLst/>
@@ -3937,7 +3729,7 @@
                 <a:ea typeface="游ゴシック" panose="020B0400000000000000" pitchFamily="50" charset="-128"/>
                 <a:cs typeface="+mn-cs"/>
               </a:rPr>
-              <a:t>/logs</a:t>
+              <a:t>/groups</a:t>
             </a:r>
             <a:endParaRPr kumimoji="1" lang="ja-JP" altLang="en-US" dirty="0"/>
           </a:p>
@@ -3945,10 +3737,10 @@
       </p:sp>
       <p:sp>
         <p:nvSpPr>
-          <p:cNvPr id="16" name="テキスト ボックス 15">
-            <a:extLst>
-              <a:ext uri="{FF2B5EF4-FFF2-40B4-BE49-F238E27FC236}">
-                <a16:creationId xmlns:a16="http://schemas.microsoft.com/office/drawing/2014/main" id="{B61BFB31-3F06-B7C4-288B-34DCF3933508}"/>
+          <p:cNvPr id="9" name="テキスト ボックス 8">
+            <a:extLst>
+              <a:ext uri="{FF2B5EF4-FFF2-40B4-BE49-F238E27FC236}">
+                <a16:creationId xmlns:a16="http://schemas.microsoft.com/office/drawing/2014/main" id="{0788878B-2597-E022-0CDD-9A4BD78DDC80}"/>
               </a:ext>
             </a:extLst>
           </p:cNvPr>
@@ -3957,8 +3749,8 @@
         </p:nvSpPr>
         <p:spPr>
           <a:xfrm>
-            <a:off x="1682794" y="4505551"/>
-            <a:ext cx="729687" cy="369332"/>
+            <a:off x="4232794" y="2308015"/>
+            <a:ext cx="898003" cy="369332"/>
           </a:xfrm>
           <a:prstGeom prst="rect">
             <a:avLst/>
@@ -3981,7 +3773,7 @@
                 <a:ea typeface="游ゴシック" panose="020B0400000000000000" pitchFamily="50" charset="-128"/>
                 <a:cs typeface="+mn-cs"/>
               </a:rPr>
-              <a:t>/http</a:t>
+              <a:t>/floors</a:t>
             </a:r>
             <a:endParaRPr kumimoji="1" lang="ja-JP" altLang="en-US" dirty="0"/>
           </a:p>
@@ -3989,10 +3781,10 @@
       </p:sp>
       <p:sp>
         <p:nvSpPr>
-          <p:cNvPr id="17" name="テキスト ボックス 16">
-            <a:extLst>
-              <a:ext uri="{FF2B5EF4-FFF2-40B4-BE49-F238E27FC236}">
-                <a16:creationId xmlns:a16="http://schemas.microsoft.com/office/drawing/2014/main" id="{7BA4B642-6C80-05B5-6A46-CCFF36406493}"/>
+          <p:cNvPr id="10" name="テキスト ボックス 9">
+            <a:extLst>
+              <a:ext uri="{FF2B5EF4-FFF2-40B4-BE49-F238E27FC236}">
+                <a16:creationId xmlns:a16="http://schemas.microsoft.com/office/drawing/2014/main" id="{8ED9F0FE-864F-8975-4873-F72BA74F71E0}"/>
               </a:ext>
             </a:extLst>
           </p:cNvPr>
@@ -4001,56 +3793,8 @@
         </p:nvSpPr>
         <p:spPr>
           <a:xfrm>
-            <a:off x="3224439" y="4479511"/>
-            <a:ext cx="1063112" cy="369332"/>
-          </a:xfrm>
-          <a:prstGeom prst="rect">
-            <a:avLst/>
-          </a:prstGeom>
-          <a:noFill/>
-        </p:spPr>
-        <p:txBody>
-          <a:bodyPr wrap="none" rtlCol="0">
-            <a:spAutoFit/>
-          </a:bodyPr>
-          <a:lstStyle/>
-          <a:p>
-            <a:r>
-              <a:rPr kumimoji="1" lang="en-US" altLang="ja-JP" sz="1800" kern="1200" dirty="0">
-                <a:solidFill>
-                  <a:schemeClr val="accent1"/>
-                </a:solidFill>
-                <a:effectLst/>
-                <a:latin typeface="游ゴシック" panose="020B0400000000000000" pitchFamily="50" charset="-128"/>
-                <a:ea typeface="游ゴシック" panose="020B0400000000000000" pitchFamily="50" charset="-128"/>
-                <a:cs typeface="+mn-cs"/>
-              </a:rPr>
-              <a:t>/medias</a:t>
-            </a:r>
-            <a:endParaRPr kumimoji="1" lang="ja-JP" altLang="en-US" dirty="0">
-              <a:solidFill>
-                <a:schemeClr val="accent1"/>
-              </a:solidFill>
-            </a:endParaRPr>
-          </a:p>
-        </p:txBody>
-      </p:sp>
-      <p:sp>
-        <p:nvSpPr>
-          <p:cNvPr id="18" name="テキスト ボックス 17">
-            <a:extLst>
-              <a:ext uri="{FF2B5EF4-FFF2-40B4-BE49-F238E27FC236}">
-                <a16:creationId xmlns:a16="http://schemas.microsoft.com/office/drawing/2014/main" id="{E9063A12-15BA-1CF8-B1C1-C8F612D1B98F}"/>
-              </a:ext>
-            </a:extLst>
-          </p:cNvPr>
-          <p:cNvSpPr txBox="1"/>
-          <p:nvPr/>
-        </p:nvSpPr>
-        <p:spPr>
-          <a:xfrm>
-            <a:off x="3224439" y="4944194"/>
-            <a:ext cx="2539478" cy="369332"/>
+            <a:off x="4232794" y="2776175"/>
+            <a:ext cx="1013419" cy="369332"/>
           </a:xfrm>
           <a:prstGeom prst="rect">
             <a:avLst/>
@@ -4085,8 +3829,184 @@
                 <a:ea typeface="游ゴシック" panose="020B0400000000000000" pitchFamily="50" charset="-128"/>
                 <a:cs typeface="+mn-cs"/>
               </a:rPr>
+              <a:t>greads</a:t>
+            </a:r>
+            <a:endParaRPr kumimoji="1" lang="ja-JP" altLang="en-US" dirty="0"/>
+          </a:p>
+        </p:txBody>
+      </p:sp>
+      <p:sp>
+        <p:nvSpPr>
+          <p:cNvPr id="12" name="テキスト ボックス 11">
+            <a:extLst>
+              <a:ext uri="{FF2B5EF4-FFF2-40B4-BE49-F238E27FC236}">
+                <a16:creationId xmlns:a16="http://schemas.microsoft.com/office/drawing/2014/main" id="{091C4576-CA3A-78E9-20E5-02E0C65EFBEF}"/>
+              </a:ext>
+            </a:extLst>
+          </p:cNvPr>
+          <p:cNvSpPr txBox="1"/>
+          <p:nvPr/>
+        </p:nvSpPr>
+        <p:spPr>
+          <a:xfrm>
+            <a:off x="4232794" y="3244335"/>
+            <a:ext cx="1063112" cy="369332"/>
+          </a:xfrm>
+          <a:prstGeom prst="rect">
+            <a:avLst/>
+          </a:prstGeom>
+          <a:noFill/>
+        </p:spPr>
+        <p:txBody>
+          <a:bodyPr wrap="none" rtlCol="0">
+            <a:spAutoFit/>
+          </a:bodyPr>
+          <a:lstStyle/>
+          <a:p>
+            <a:r>
+              <a:rPr kumimoji="1" lang="en-US" altLang="ja-JP" sz="1800" kern="1200" dirty="0">
+                <a:solidFill>
+                  <a:srgbClr val="000000"/>
+                </a:solidFill>
+                <a:effectLst/>
+                <a:latin typeface="游ゴシック" panose="020B0400000000000000" pitchFamily="50" charset="-128"/>
+                <a:ea typeface="游ゴシック" panose="020B0400000000000000" pitchFamily="50" charset="-128"/>
+                <a:cs typeface="+mn-cs"/>
+              </a:rPr>
+              <a:t>/medias</a:t>
+            </a:r>
+            <a:endParaRPr kumimoji="1" lang="ja-JP" altLang="en-US" dirty="0"/>
+          </a:p>
+        </p:txBody>
+      </p:sp>
+      <p:sp>
+        <p:nvSpPr>
+          <p:cNvPr id="16" name="テキスト ボックス 15">
+            <a:extLst>
+              <a:ext uri="{FF2B5EF4-FFF2-40B4-BE49-F238E27FC236}">
+                <a16:creationId xmlns:a16="http://schemas.microsoft.com/office/drawing/2014/main" id="{B61BFB31-3F06-B7C4-288B-34DCF3933508}"/>
+              </a:ext>
+            </a:extLst>
+          </p:cNvPr>
+          <p:cNvSpPr txBox="1"/>
+          <p:nvPr/>
+        </p:nvSpPr>
+        <p:spPr>
+          <a:xfrm>
+            <a:off x="1682794" y="4455533"/>
+            <a:ext cx="1774845" cy="369332"/>
+          </a:xfrm>
+          <a:prstGeom prst="rect">
+            <a:avLst/>
+          </a:prstGeom>
+          <a:noFill/>
+        </p:spPr>
+        <p:txBody>
+          <a:bodyPr wrap="none" rtlCol="0">
+            <a:spAutoFit/>
+          </a:bodyPr>
+          <a:lstStyle/>
+          <a:p>
+            <a:r>
+              <a:rPr kumimoji="1" lang="en-US" altLang="ja-JP" sz="1800" kern="1200" dirty="0">
+                <a:solidFill>
+                  <a:srgbClr val="000000"/>
+                </a:solidFill>
+                <a:effectLst/>
+                <a:latin typeface="游ゴシック" panose="020B0400000000000000" pitchFamily="50" charset="-128"/>
+                <a:ea typeface="游ゴシック" panose="020B0400000000000000" pitchFamily="50" charset="-128"/>
+                <a:cs typeface="+mn-cs"/>
+              </a:rPr>
+              <a:t>/http /</a:t>
+            </a:r>
+            <a:r>
+              <a:rPr kumimoji="1" lang="en-US" altLang="ja-JP" sz="1800" kern="1200" dirty="0" err="1">
+                <a:solidFill>
+                  <a:srgbClr val="000000"/>
+                </a:solidFill>
+                <a:effectLst/>
+                <a:latin typeface="游ゴシック" panose="020B0400000000000000" pitchFamily="50" charset="-128"/>
+                <a:ea typeface="游ゴシック" panose="020B0400000000000000" pitchFamily="50" charset="-128"/>
+                <a:cs typeface="+mn-cs"/>
+              </a:rPr>
               <a:t>webroot</a:t>
             </a:r>
+            <a:endParaRPr kumimoji="1" lang="ja-JP" altLang="en-US" dirty="0"/>
+          </a:p>
+        </p:txBody>
+      </p:sp>
+      <p:sp>
+        <p:nvSpPr>
+          <p:cNvPr id="17" name="テキスト ボックス 16">
+            <a:extLst>
+              <a:ext uri="{FF2B5EF4-FFF2-40B4-BE49-F238E27FC236}">
+                <a16:creationId xmlns:a16="http://schemas.microsoft.com/office/drawing/2014/main" id="{7BA4B642-6C80-05B5-6A46-CCFF36406493}"/>
+              </a:ext>
+            </a:extLst>
+          </p:cNvPr>
+          <p:cNvSpPr txBox="1"/>
+          <p:nvPr/>
+        </p:nvSpPr>
+        <p:spPr>
+          <a:xfrm>
+            <a:off x="4417515" y="4429493"/>
+            <a:ext cx="1063112" cy="369332"/>
+          </a:xfrm>
+          <a:prstGeom prst="rect">
+            <a:avLst/>
+          </a:prstGeom>
+          <a:noFill/>
+        </p:spPr>
+        <p:txBody>
+          <a:bodyPr wrap="none" rtlCol="0">
+            <a:spAutoFit/>
+          </a:bodyPr>
+          <a:lstStyle/>
+          <a:p>
+            <a:r>
+              <a:rPr kumimoji="1" lang="en-US" altLang="ja-JP" sz="1800" kern="1200" dirty="0">
+                <a:solidFill>
+                  <a:srgbClr val="000000"/>
+                </a:solidFill>
+                <a:effectLst/>
+                <a:latin typeface="游ゴシック" panose="020B0400000000000000" pitchFamily="50" charset="-128"/>
+                <a:ea typeface="游ゴシック" panose="020B0400000000000000" pitchFamily="50" charset="-128"/>
+                <a:cs typeface="+mn-cs"/>
+              </a:rPr>
+              <a:t>/medias</a:t>
+            </a:r>
+            <a:endParaRPr kumimoji="1" lang="ja-JP" altLang="en-US" dirty="0"/>
+          </a:p>
+        </p:txBody>
+      </p:sp>
+      <p:sp>
+        <p:nvSpPr>
+          <p:cNvPr id="18" name="テキスト ボックス 17">
+            <a:extLst>
+              <a:ext uri="{FF2B5EF4-FFF2-40B4-BE49-F238E27FC236}">
+                <a16:creationId xmlns:a16="http://schemas.microsoft.com/office/drawing/2014/main" id="{E9063A12-15BA-1CF8-B1C1-C8F612D1B98F}"/>
+              </a:ext>
+            </a:extLst>
+          </p:cNvPr>
+          <p:cNvSpPr txBox="1"/>
+          <p:nvPr/>
+        </p:nvSpPr>
+        <p:spPr>
+          <a:xfrm>
+            <a:off x="4417515" y="4894176"/>
+            <a:ext cx="1560042" cy="369332"/>
+          </a:xfrm>
+          <a:prstGeom prst="rect">
+            <a:avLst/>
+          </a:prstGeom>
+          <a:noFill/>
+        </p:spPr>
+        <p:txBody>
+          <a:bodyPr wrap="none" rtlCol="0">
+            <a:spAutoFit/>
+          </a:bodyPr>
+          <a:lstStyle/>
+          <a:p>
             <a:r>
               <a:rPr kumimoji="1" lang="en-US" altLang="ja-JP" sz="1800" kern="1200" dirty="0">
                 <a:solidFill>
@@ -4145,7 +4065,7 @@
         </p:nvCxnSpPr>
         <p:spPr>
           <a:xfrm>
-            <a:off x="2994372" y="1391473"/>
+            <a:off x="2994372" y="2024517"/>
             <a:ext cx="235132" cy="5"/>
           </a:xfrm>
           <a:prstGeom prst="line">
@@ -4185,7 +4105,7 @@
         </p:nvCxnSpPr>
         <p:spPr>
           <a:xfrm flipV="1">
-            <a:off x="3997663" y="1391477"/>
+            <a:off x="3997663" y="2024521"/>
             <a:ext cx="235132" cy="1"/>
           </a:xfrm>
           <a:prstGeom prst="line">
@@ -4221,7 +4141,7 @@
         </p:nvSpPr>
         <p:spPr>
           <a:xfrm>
-            <a:off x="1682794" y="1206807"/>
+            <a:off x="1682794" y="1839851"/>
             <a:ext cx="1311578" cy="369332"/>
           </a:xfrm>
           <a:prstGeom prst="rect">
@@ -4277,7 +4197,7 @@
         </p:nvSpPr>
         <p:spPr>
           <a:xfrm>
-            <a:off x="3229504" y="1206812"/>
+            <a:off x="3229504" y="1839856"/>
             <a:ext cx="768159" cy="369332"/>
           </a:xfrm>
           <a:prstGeom prst="rect">
@@ -4324,7 +4244,7 @@
         </p:nvCxnSpPr>
         <p:spPr>
           <a:xfrm>
-            <a:off x="3997663" y="1391478"/>
+            <a:off x="3997663" y="2024522"/>
             <a:ext cx="235131" cy="468159"/>
           </a:xfrm>
           <a:prstGeom prst="bentConnector3">
@@ -4363,7 +4283,7 @@
         </p:nvCxnSpPr>
         <p:spPr>
           <a:xfrm>
-            <a:off x="3997663" y="1391478"/>
+            <a:off x="3997663" y="2024522"/>
             <a:ext cx="235131" cy="936319"/>
           </a:xfrm>
           <a:prstGeom prst="bentConnector3">
@@ -4402,7 +4322,7 @@
         </p:nvCxnSpPr>
         <p:spPr>
           <a:xfrm>
-            <a:off x="3997663" y="1391478"/>
+            <a:off x="3997663" y="2024522"/>
             <a:ext cx="235131" cy="1404479"/>
           </a:xfrm>
           <a:prstGeom prst="bentConnector3">
@@ -4426,45 +4346,6 @@
       </p:cxnSp>
       <p:cxnSp>
         <p:nvCxnSpPr>
-          <p:cNvPr id="40" name="コネクタ: カギ線 39">
-            <a:extLst>
-              <a:ext uri="{FF2B5EF4-FFF2-40B4-BE49-F238E27FC236}">
-                <a16:creationId xmlns:a16="http://schemas.microsoft.com/office/drawing/2014/main" id="{06B061D9-32D5-BF2A-C939-9922B57AD6CF}"/>
-              </a:ext>
-            </a:extLst>
-          </p:cNvPr>
-          <p:cNvCxnSpPr>
-            <a:stCxn id="29" idx="3"/>
-            <a:endCxn id="13" idx="1"/>
-          </p:cNvCxnSpPr>
-          <p:nvPr/>
-        </p:nvCxnSpPr>
-        <p:spPr>
-          <a:xfrm>
-            <a:off x="2994372" y="1391473"/>
-            <a:ext cx="230067" cy="2804544"/>
-          </a:xfrm>
-          <a:prstGeom prst="bentConnector3">
-            <a:avLst/>
-          </a:prstGeom>
-        </p:spPr>
-        <p:style>
-          <a:lnRef idx="1">
-            <a:schemeClr val="accent1"/>
-          </a:lnRef>
-          <a:fillRef idx="0">
-            <a:schemeClr val="accent1"/>
-          </a:fillRef>
-          <a:effectRef idx="0">
-            <a:schemeClr val="accent1"/>
-          </a:effectRef>
-          <a:fontRef idx="minor">
-            <a:schemeClr val="tx1"/>
-          </a:fontRef>
-        </p:style>
-      </p:cxnSp>
-      <p:cxnSp>
-        <p:nvCxnSpPr>
           <p:cNvPr id="45" name="直線コネクタ 44">
             <a:extLst>
               <a:ext uri="{FF2B5EF4-FFF2-40B4-BE49-F238E27FC236}">
@@ -4480,7 +4361,7 @@
         </p:nvCxnSpPr>
         <p:spPr>
           <a:xfrm>
-            <a:off x="1447661" y="1389096"/>
+            <a:off x="1447661" y="2022140"/>
             <a:ext cx="235133" cy="2377"/>
           </a:xfrm>
           <a:prstGeom prst="line">
@@ -4517,9 +4398,9 @@
           <p:nvPr/>
         </p:nvCxnSpPr>
         <p:spPr>
-          <a:xfrm>
-            <a:off x="2412481" y="4690217"/>
-            <a:ext cx="933969" cy="3480"/>
+          <a:xfrm flipH="1">
+            <a:off x="3346450" y="4640199"/>
+            <a:ext cx="111189" cy="3480"/>
           </a:xfrm>
           <a:prstGeom prst="line">
             <a:avLst/>
@@ -4557,8 +4438,49 @@
         </p:nvCxnSpPr>
         <p:spPr>
           <a:xfrm>
-            <a:off x="2412481" y="4690217"/>
-            <a:ext cx="811958" cy="438643"/>
+            <a:off x="3457639" y="4640199"/>
+            <a:ext cx="959876" cy="438643"/>
+          </a:xfrm>
+          <a:prstGeom prst="bentConnector3">
+            <a:avLst>
+              <a:gd name="adj1" fmla="val 50000"/>
+            </a:avLst>
+          </a:prstGeom>
+        </p:spPr>
+        <p:style>
+          <a:lnRef idx="1">
+            <a:schemeClr val="accent1"/>
+          </a:lnRef>
+          <a:fillRef idx="0">
+            <a:schemeClr val="accent1"/>
+          </a:fillRef>
+          <a:effectRef idx="0">
+            <a:schemeClr val="accent1"/>
+          </a:effectRef>
+          <a:fontRef idx="minor">
+            <a:schemeClr val="tx1"/>
+          </a:fontRef>
+        </p:style>
+      </p:cxnSp>
+      <p:cxnSp>
+        <p:nvCxnSpPr>
+          <p:cNvPr id="51" name="コネクタ: カギ線 50">
+            <a:extLst>
+              <a:ext uri="{FF2B5EF4-FFF2-40B4-BE49-F238E27FC236}">
+                <a16:creationId xmlns:a16="http://schemas.microsoft.com/office/drawing/2014/main" id="{3A4B3DBE-51B2-CCEC-58FC-503D50C1B3F2}"/>
+              </a:ext>
+            </a:extLst>
+          </p:cNvPr>
+          <p:cNvCxnSpPr>
+            <a:stCxn id="4" idx="3"/>
+            <a:endCxn id="16" idx="1"/>
+          </p:cNvCxnSpPr>
+          <p:nvPr/>
+        </p:nvCxnSpPr>
+        <p:spPr>
+          <a:xfrm>
+            <a:off x="1447661" y="2022140"/>
+            <a:ext cx="235133" cy="2618059"/>
           </a:xfrm>
           <a:prstGeom prst="bentConnector3">
             <a:avLst/>
@@ -4581,23 +4503,24 @@
       </p:cxnSp>
       <p:cxnSp>
         <p:nvCxnSpPr>
-          <p:cNvPr id="51" name="コネクタ: カギ線 50">
-            <a:extLst>
-              <a:ext uri="{FF2B5EF4-FFF2-40B4-BE49-F238E27FC236}">
-                <a16:creationId xmlns:a16="http://schemas.microsoft.com/office/drawing/2014/main" id="{3A4B3DBE-51B2-CCEC-58FC-503D50C1B3F2}"/>
+          <p:cNvPr id="58" name="コネクタ: カギ線 57">
+            <a:extLst>
+              <a:ext uri="{FF2B5EF4-FFF2-40B4-BE49-F238E27FC236}">
+                <a16:creationId xmlns:a16="http://schemas.microsoft.com/office/drawing/2014/main" id="{F2EB7E0A-6C5D-C18B-09F6-CAB92F7F6A15}"/>
               </a:ext>
             </a:extLst>
           </p:cNvPr>
           <p:cNvCxnSpPr>
-            <a:stCxn id="4" idx="3"/>
-            <a:endCxn id="16" idx="1"/>
+            <a:cxnSpLocks/>
+            <a:stCxn id="29" idx="3"/>
+            <a:endCxn id="14" idx="1"/>
           </p:cNvCxnSpPr>
           <p:nvPr/>
         </p:nvCxnSpPr>
         <p:spPr>
           <a:xfrm>
-            <a:off x="1447661" y="1389096"/>
-            <a:ext cx="235133" cy="3301121"/>
+            <a:off x="2994372" y="2024517"/>
+            <a:ext cx="272001" cy="2192655"/>
           </a:xfrm>
           <a:prstGeom prst="bentConnector3">
             <a:avLst/>
@@ -4620,10 +4543,10 @@
       </p:cxnSp>
       <p:sp>
         <p:nvSpPr>
-          <p:cNvPr id="53" name="テキスト ボックス 52">
-            <a:extLst>
-              <a:ext uri="{FF2B5EF4-FFF2-40B4-BE49-F238E27FC236}">
-                <a16:creationId xmlns:a16="http://schemas.microsoft.com/office/drawing/2014/main" id="{9E74F5CB-36CA-1C2F-2ACC-8EB74D02B0DC}"/>
+          <p:cNvPr id="14" name="テキスト ボックス 13">
+            <a:extLst>
+              <a:ext uri="{FF2B5EF4-FFF2-40B4-BE49-F238E27FC236}">
+                <a16:creationId xmlns:a16="http://schemas.microsoft.com/office/drawing/2014/main" id="{9BE66026-B97F-417E-C2EF-C67EF253CECD}"/>
               </a:ext>
             </a:extLst>
           </p:cNvPr>
@@ -4632,8 +4555,8 @@
         </p:nvSpPr>
         <p:spPr>
           <a:xfrm>
-            <a:off x="3224439" y="3077241"/>
-            <a:ext cx="2185214" cy="369332"/>
+            <a:off x="3266373" y="4032506"/>
+            <a:ext cx="731290" cy="369332"/>
           </a:xfrm>
           <a:prstGeom prst="rect">
             <a:avLst/>
@@ -4649,114 +4572,82 @@
             <a:r>
               <a:rPr kumimoji="1" lang="en-US" altLang="ja-JP" sz="1800" kern="1200" dirty="0">
                 <a:solidFill>
-                  <a:schemeClr val="accent1"/>
+                  <a:srgbClr val="000000"/>
                 </a:solidFill>
                 <a:effectLst/>
                 <a:latin typeface="游ゴシック" panose="020B0400000000000000" pitchFamily="50" charset="-128"/>
                 <a:ea typeface="游ゴシック" panose="020B0400000000000000" pitchFamily="50" charset="-128"/>
                 <a:cs typeface="+mn-cs"/>
               </a:rPr>
-              <a:t>/</a:t>
-            </a:r>
-            <a:r>
-              <a:rPr kumimoji="1" lang="en-US" altLang="ja-JP" sz="1800" kern="1200" dirty="0" err="1">
+              <a:t>/logs</a:t>
+            </a:r>
+            <a:endParaRPr kumimoji="1" lang="ja-JP" altLang="en-US" dirty="0"/>
+          </a:p>
+        </p:txBody>
+      </p:sp>
+      <p:sp>
+        <p:nvSpPr>
+          <p:cNvPr id="3" name="テキスト ボックス 2">
+            <a:extLst>
+              <a:ext uri="{FF2B5EF4-FFF2-40B4-BE49-F238E27FC236}">
+                <a16:creationId xmlns:a16="http://schemas.microsoft.com/office/drawing/2014/main" id="{1B20C283-1A39-2EDD-B873-FC446553ED1A}"/>
+              </a:ext>
+            </a:extLst>
+          </p:cNvPr>
+          <p:cNvSpPr txBox="1"/>
+          <p:nvPr/>
+        </p:nvSpPr>
+        <p:spPr>
+          <a:xfrm>
+            <a:off x="4199238" y="3613640"/>
+            <a:ext cx="1064715" cy="369332"/>
+          </a:xfrm>
+          <a:prstGeom prst="rect">
+            <a:avLst/>
+          </a:prstGeom>
+          <a:noFill/>
+        </p:spPr>
+        <p:txBody>
+          <a:bodyPr wrap="none" rtlCol="0">
+            <a:spAutoFit/>
+          </a:bodyPr>
+          <a:lstStyle/>
+          <a:p>
+            <a:r>
+              <a:rPr kumimoji="1" lang="en-US" altLang="ja-JP" sz="1800" kern="1200" dirty="0">
                 <a:solidFill>
-                  <a:schemeClr val="accent1"/>
+                  <a:srgbClr val="000000"/>
                 </a:solidFill>
                 <a:effectLst/>
                 <a:latin typeface="游ゴシック" panose="020B0400000000000000" pitchFamily="50" charset="-128"/>
                 <a:ea typeface="游ゴシック" panose="020B0400000000000000" pitchFamily="50" charset="-128"/>
                 <a:cs typeface="+mn-cs"/>
               </a:rPr>
-              <a:t>floor_indexer.json</a:t>
-            </a:r>
-            <a:endParaRPr kumimoji="1" lang="ja-JP" altLang="en-US" dirty="0">
-              <a:solidFill>
-                <a:schemeClr val="accent1"/>
-              </a:solidFill>
-            </a:endParaRPr>
-          </a:p>
-        </p:txBody>
-      </p:sp>
-      <p:sp>
-        <p:nvSpPr>
-          <p:cNvPr id="54" name="テキスト ボックス 53">
-            <a:extLst>
-              <a:ext uri="{FF2B5EF4-FFF2-40B4-BE49-F238E27FC236}">
-                <a16:creationId xmlns:a16="http://schemas.microsoft.com/office/drawing/2014/main" id="{46B412DF-5279-95FF-EB23-8765099910BF}"/>
-              </a:ext>
-            </a:extLst>
-          </p:cNvPr>
-          <p:cNvSpPr txBox="1"/>
-          <p:nvPr/>
-        </p:nvSpPr>
-        <p:spPr>
-          <a:xfrm>
-            <a:off x="3224439" y="3545401"/>
-            <a:ext cx="2300630" cy="369332"/>
-          </a:xfrm>
-          <a:prstGeom prst="rect">
-            <a:avLst/>
-          </a:prstGeom>
-          <a:noFill/>
-        </p:spPr>
-        <p:txBody>
-          <a:bodyPr wrap="none" rtlCol="0">
-            <a:spAutoFit/>
-          </a:bodyPr>
-          <a:lstStyle/>
-          <a:p>
-            <a:r>
-              <a:rPr kumimoji="1" lang="en-US" altLang="ja-JP" sz="1800" kern="1200" dirty="0">
-                <a:solidFill>
-                  <a:schemeClr val="accent1"/>
-                </a:solidFill>
-                <a:effectLst/>
-                <a:latin typeface="游ゴシック" panose="020B0400000000000000" pitchFamily="50" charset="-128"/>
-                <a:ea typeface="游ゴシック" panose="020B0400000000000000" pitchFamily="50" charset="-128"/>
-                <a:cs typeface="+mn-cs"/>
-              </a:rPr>
-              <a:t>/</a:t>
-            </a:r>
-            <a:r>
-              <a:rPr kumimoji="1" lang="en-US" altLang="ja-JP" sz="1800" kern="1200" dirty="0" err="1">
-                <a:solidFill>
-                  <a:schemeClr val="accent1"/>
-                </a:solidFill>
-                <a:effectLst/>
-                <a:latin typeface="游ゴシック" panose="020B0400000000000000" pitchFamily="50" charset="-128"/>
-                <a:ea typeface="游ゴシック" panose="020B0400000000000000" pitchFamily="50" charset="-128"/>
-                <a:cs typeface="+mn-cs"/>
-              </a:rPr>
-              <a:t>gread_indexer.json</a:t>
-            </a:r>
-            <a:endParaRPr kumimoji="1" lang="ja-JP" altLang="en-US" dirty="0">
-              <a:solidFill>
-                <a:schemeClr val="accent1"/>
-              </a:solidFill>
-            </a:endParaRPr>
+              <a:t>/ events</a:t>
+            </a:r>
+            <a:endParaRPr kumimoji="1" lang="ja-JP" altLang="en-US" dirty="0"/>
           </a:p>
         </p:txBody>
       </p:sp>
       <p:cxnSp>
         <p:nvCxnSpPr>
-          <p:cNvPr id="58" name="コネクタ: カギ線 57">
-            <a:extLst>
-              <a:ext uri="{FF2B5EF4-FFF2-40B4-BE49-F238E27FC236}">
-                <a16:creationId xmlns:a16="http://schemas.microsoft.com/office/drawing/2014/main" id="{F2EB7E0A-6C5D-C18B-09F6-CAB92F7F6A15}"/>
+          <p:cNvPr id="6" name="コネクタ: カギ線 5">
+            <a:extLst>
+              <a:ext uri="{FF2B5EF4-FFF2-40B4-BE49-F238E27FC236}">
+                <a16:creationId xmlns:a16="http://schemas.microsoft.com/office/drawing/2014/main" id="{C1752D80-E8A5-B637-8005-584D6585E574}"/>
               </a:ext>
             </a:extLst>
           </p:cNvPr>
           <p:cNvCxnSpPr>
-            <a:stCxn id="29" idx="3"/>
-            <a:endCxn id="53" idx="1"/>
+            <a:stCxn id="30" idx="3"/>
+            <a:endCxn id="3" idx="1"/>
           </p:cNvCxnSpPr>
           <p:nvPr/>
         </p:nvCxnSpPr>
         <p:spPr>
           <a:xfrm>
-            <a:off x="2994372" y="1391473"/>
-            <a:ext cx="230067" cy="1870434"/>
+            <a:off x="3997663" y="2024522"/>
+            <a:ext cx="201575" cy="1773784"/>
           </a:xfrm>
           <a:prstGeom prst="bentConnector3">
             <a:avLst/>
@@ -4777,217 +4668,6 @@
           </a:fontRef>
         </p:style>
       </p:cxnSp>
-      <p:cxnSp>
-        <p:nvCxnSpPr>
-          <p:cNvPr id="60" name="コネクタ: カギ線 59">
-            <a:extLst>
-              <a:ext uri="{FF2B5EF4-FFF2-40B4-BE49-F238E27FC236}">
-                <a16:creationId xmlns:a16="http://schemas.microsoft.com/office/drawing/2014/main" id="{56C74317-5376-F975-3B75-E43322359573}"/>
-              </a:ext>
-            </a:extLst>
-          </p:cNvPr>
-          <p:cNvCxnSpPr>
-            <a:stCxn id="29" idx="3"/>
-            <a:endCxn id="54" idx="1"/>
-          </p:cNvCxnSpPr>
-          <p:nvPr/>
-        </p:nvCxnSpPr>
-        <p:spPr>
-          <a:xfrm>
-            <a:off x="2994372" y="1391473"/>
-            <a:ext cx="230067" cy="2338594"/>
-          </a:xfrm>
-          <a:prstGeom prst="bentConnector3">
-            <a:avLst/>
-          </a:prstGeom>
-        </p:spPr>
-        <p:style>
-          <a:lnRef idx="1">
-            <a:schemeClr val="accent1"/>
-          </a:lnRef>
-          <a:fillRef idx="0">
-            <a:schemeClr val="accent1"/>
-          </a:fillRef>
-          <a:effectRef idx="0">
-            <a:schemeClr val="accent1"/>
-          </a:effectRef>
-          <a:fontRef idx="minor">
-            <a:schemeClr val="tx1"/>
-          </a:fontRef>
-        </p:style>
-      </p:cxnSp>
-      <p:graphicFrame>
-        <p:nvGraphicFramePr>
-          <p:cNvPr id="5" name="表 5">
-            <a:extLst>
-              <a:ext uri="{FF2B5EF4-FFF2-40B4-BE49-F238E27FC236}">
-                <a16:creationId xmlns:a16="http://schemas.microsoft.com/office/drawing/2014/main" id="{A4FC3ABA-FA6B-9C4D-166E-AC12D9171C08}"/>
-              </a:ext>
-            </a:extLst>
-          </p:cNvPr>
-          <p:cNvGraphicFramePr>
-            <a:graphicFrameLocks noGrp="1"/>
-          </p:cNvGraphicFramePr>
-          <p:nvPr>
-            <p:extLst>
-              <p:ext uri="{D42A27DB-BD31-4B8C-83A1-F6EECF244321}">
-                <p14:modId xmlns:p14="http://schemas.microsoft.com/office/powerpoint/2010/main" val="3705788935"/>
-              </p:ext>
-            </p:extLst>
-          </p:nvPr>
-        </p:nvGraphicFramePr>
-        <p:xfrm>
-          <a:off x="838199" y="5540370"/>
-          <a:ext cx="10515600" cy="1097280"/>
-        </p:xfrm>
-        <a:graphic>
-          <a:graphicData uri="http://schemas.openxmlformats.org/drawingml/2006/table">
-            <a:tbl>
-              <a:tblPr firstRow="1" bandRow="1">
-                <a:tableStyleId>{C083E6E3-FA7D-4D7B-A595-EF9225AFEA82}</a:tableStyleId>
-              </a:tblPr>
-              <a:tblGrid>
-                <a:gridCol w="5257800">
-                  <a:extLst>
-                    <a:ext uri="{9D8B030D-6E8A-4147-A177-3AD203B41FA5}">
-                      <a16:colId xmlns:a16="http://schemas.microsoft.com/office/drawing/2014/main" val="824063389"/>
-                    </a:ext>
-                  </a:extLst>
-                </a:gridCol>
-                <a:gridCol w="5257800">
-                  <a:extLst>
-                    <a:ext uri="{9D8B030D-6E8A-4147-A177-3AD203B41FA5}">
-                      <a16:colId xmlns:a16="http://schemas.microsoft.com/office/drawing/2014/main" val="2576557213"/>
-                    </a:ext>
-                  </a:extLst>
-                </a:gridCol>
-              </a:tblGrid>
-              <a:tr h="208671">
-                <a:tc>
-                  <a:txBody>
-                    <a:bodyPr/>
-                    <a:lstStyle/>
-                    <a:p>
-                      <a:r>
-                        <a:rPr lang="en-US" dirty="0"/>
-                        <a:t>Font color</a:t>
-                      </a:r>
-                      <a:endParaRPr lang="en-US" i="0" dirty="0"/>
-                    </a:p>
-                  </a:txBody>
-                  <a:tcPr/>
-                </a:tc>
-                <a:tc>
-                  <a:txBody>
-                    <a:bodyPr/>
-                    <a:lstStyle/>
-                    <a:p>
-                      <a:r>
-                        <a:rPr lang="en-US" dirty="0"/>
-                        <a:t>Way of mutual exclusion</a:t>
-                      </a:r>
-                    </a:p>
-                  </a:txBody>
-                  <a:tcPr/>
-                </a:tc>
-                <a:extLst>
-                  <a:ext uri="{0D108BD9-81ED-4DB2-BD59-A6C34878D82A}">
-                    <a16:rowId xmlns:a16="http://schemas.microsoft.com/office/drawing/2014/main" val="338400580"/>
-                  </a:ext>
-                </a:extLst>
-              </a:tr>
-              <a:tr h="208671">
-                <a:tc>
-                  <a:txBody>
-                    <a:bodyPr/>
-                    <a:lstStyle/>
-                    <a:p>
-                      <a:r>
-                        <a:rPr lang="en-US" dirty="0">
-                          <a:solidFill>
-                            <a:schemeClr val="accent2"/>
-                          </a:solidFill>
-                        </a:rPr>
-                        <a:t>Orange</a:t>
-                      </a:r>
-                    </a:p>
-                  </a:txBody>
-                  <a:tcPr/>
-                </a:tc>
-                <a:tc>
-                  <a:txBody>
-                    <a:bodyPr/>
-                    <a:lstStyle/>
-                    <a:p>
-                      <a:r>
-                        <a:rPr kumimoji="1" lang="en-US" sz="1800" b="0" kern="1200" dirty="0">
-                          <a:solidFill>
-                            <a:schemeClr val="dk1"/>
-                          </a:solidFill>
-                          <a:effectLst/>
-                        </a:rPr>
-                        <a:t>Optimistic locking</a:t>
-                      </a:r>
-                      <a:endParaRPr kumimoji="1" lang="en-US" sz="1800" b="0" kern="1200" dirty="0">
-                        <a:solidFill>
-                          <a:schemeClr val="dk1"/>
-                        </a:solidFill>
-                        <a:effectLst/>
-                        <a:latin typeface="+mn-lt"/>
-                        <a:ea typeface="+mn-ea"/>
-                        <a:cs typeface="+mn-cs"/>
-                      </a:endParaRPr>
-                    </a:p>
-                  </a:txBody>
-                  <a:tcPr/>
-                </a:tc>
-                <a:extLst>
-                  <a:ext uri="{0D108BD9-81ED-4DB2-BD59-A6C34878D82A}">
-                    <a16:rowId xmlns:a16="http://schemas.microsoft.com/office/drawing/2014/main" val="3339856039"/>
-                  </a:ext>
-                </a:extLst>
-              </a:tr>
-              <a:tr h="208671">
-                <a:tc>
-                  <a:txBody>
-                    <a:bodyPr/>
-                    <a:lstStyle/>
-                    <a:p>
-                      <a:r>
-                        <a:rPr lang="en-US" dirty="0">
-                          <a:solidFill>
-                            <a:schemeClr val="accent1"/>
-                          </a:solidFill>
-                        </a:rPr>
-                        <a:t>Blue</a:t>
-                      </a:r>
-                    </a:p>
-                  </a:txBody>
-                  <a:tcPr/>
-                </a:tc>
-                <a:tc>
-                  <a:txBody>
-                    <a:bodyPr/>
-                    <a:lstStyle/>
-                    <a:p>
-                      <a:r>
-                        <a:rPr lang="en-US" dirty="0"/>
-                        <a:t>Pessimistic locking</a:t>
-                      </a:r>
-                    </a:p>
-                  </a:txBody>
-                  <a:tcPr/>
-                </a:tc>
-                <a:extLst>
-                  <a:ext uri="{0D108BD9-81ED-4DB2-BD59-A6C34878D82A}">
-                    <a16:rowId xmlns:a16="http://schemas.microsoft.com/office/drawing/2014/main" val="251746444"/>
-                  </a:ext>
-                </a:extLst>
-              </a:tr>
-            </a:tbl>
-          </a:graphicData>
-        </a:graphic>
-      </p:graphicFrame>
     </p:spTree>
     <p:extLst>
       <p:ext uri="{BB962C8B-B14F-4D97-AF65-F5344CB8AC3E}">

</xml_diff>